<commit_message>
Adding bokeh slides by agilman
</commit_message>
<xml_diff>
--- a/techassess_kside.pptx
+++ b/techassess_kside.pptx
@@ -5,7 +5,7 @@
     <p:sldMasterId id="2147483648" r:id="rId1"/>
   </p:sldMasterIdLst>
   <p:notesMasterIdLst>
-    <p:notesMasterId r:id="rId10"/>
+    <p:notesMasterId r:id="rId17"/>
   </p:notesMasterIdLst>
   <p:sldIdLst>
     <p:sldId id="256" r:id="rId2"/>
@@ -16,6 +16,13 @@
     <p:sldId id="262" r:id="rId7"/>
     <p:sldId id="263" r:id="rId8"/>
     <p:sldId id="264" r:id="rId9"/>
+    <p:sldId id="265" r:id="rId10"/>
+    <p:sldId id="266" r:id="rId11"/>
+    <p:sldId id="267" r:id="rId12"/>
+    <p:sldId id="268" r:id="rId13"/>
+    <p:sldId id="269" r:id="rId14"/>
+    <p:sldId id="270" r:id="rId15"/>
+    <p:sldId id="271" r:id="rId16"/>
   </p:sldIdLst>
   <p:sldSz cx="9144000" cy="6858000" type="screen4x3"/>
   <p:notesSz cx="6858000" cy="9144000"/>
@@ -116,7 +123,7 @@
   </p:defaultTextStyle>
   <p:extLst>
     <p:ext uri="{EFAFB233-063F-42B5-8137-9DF3F51BA10A}">
-      <p15:sldGuideLst xmlns:p15="http://schemas.microsoft.com/office/powerpoint/2012/main">
+      <p15:sldGuideLst xmlns:p15="http://schemas.microsoft.com/office/powerpoint/2012/main" xmlns="">
         <p15:guide id="1" orient="horz" pos="2160">
           <p15:clr>
             <a:srgbClr val="A4A3A4"/>
@@ -1029,10 +1036,24 @@
     <dgm:pt modelId="{3D791591-0185-4092-8A9E-2E66123724D9}" type="pres">
       <dgm:prSet presAssocID="{DFBE70A0-8A41-4ED1-A56B-F0FCB1F61E9F}" presName="sibTrans" presStyleLbl="sibTrans2D1" presStyleIdx="0" presStyleCnt="2"/>
       <dgm:spPr/>
+      <dgm:t>
+        <a:bodyPr/>
+        <a:lstStyle/>
+        <a:p>
+          <a:endParaRPr lang="en-US"/>
+        </a:p>
+      </dgm:t>
     </dgm:pt>
     <dgm:pt modelId="{44DD5C11-B8FE-4ADD-B37C-68E9DF3B8BE6}" type="pres">
       <dgm:prSet presAssocID="{DFBE70A0-8A41-4ED1-A56B-F0FCB1F61E9F}" presName="connectorText" presStyleLbl="sibTrans2D1" presStyleIdx="0" presStyleCnt="2"/>
       <dgm:spPr/>
+      <dgm:t>
+        <a:bodyPr/>
+        <a:lstStyle/>
+        <a:p>
+          <a:endParaRPr lang="en-US"/>
+        </a:p>
+      </dgm:t>
     </dgm:pt>
     <dgm:pt modelId="{989FFA8B-1493-4E60-A3CB-740A937B7A37}" type="pres">
       <dgm:prSet presAssocID="{9DFF7B32-ECAD-4679-8A4A-7E4565660726}" presName="node" presStyleLbl="node1" presStyleIdx="1" presStyleCnt="3">
@@ -1041,14 +1062,35 @@
         </dgm:presLayoutVars>
       </dgm:prSet>
       <dgm:spPr/>
+      <dgm:t>
+        <a:bodyPr/>
+        <a:lstStyle/>
+        <a:p>
+          <a:endParaRPr lang="en-US"/>
+        </a:p>
+      </dgm:t>
     </dgm:pt>
     <dgm:pt modelId="{187C843A-6549-4769-AD4E-6F4CF4C566BE}" type="pres">
       <dgm:prSet presAssocID="{65178A7E-F802-44D3-96C0-91F550396900}" presName="sibTrans" presStyleLbl="sibTrans2D1" presStyleIdx="1" presStyleCnt="2"/>
       <dgm:spPr/>
+      <dgm:t>
+        <a:bodyPr/>
+        <a:lstStyle/>
+        <a:p>
+          <a:endParaRPr lang="en-US"/>
+        </a:p>
+      </dgm:t>
     </dgm:pt>
     <dgm:pt modelId="{54CBCBE7-6D52-45F2-A301-F536CB2E1D2C}" type="pres">
       <dgm:prSet presAssocID="{65178A7E-F802-44D3-96C0-91F550396900}" presName="connectorText" presStyleLbl="sibTrans2D1" presStyleIdx="1" presStyleCnt="2"/>
       <dgm:spPr/>
+      <dgm:t>
+        <a:bodyPr/>
+        <a:lstStyle/>
+        <a:p>
+          <a:endParaRPr lang="en-US"/>
+        </a:p>
+      </dgm:t>
     </dgm:pt>
     <dgm:pt modelId="{5C6A62AC-5B30-426D-B91A-EAB403D93C5A}" type="pres">
       <dgm:prSet presAssocID="{6B500DEC-C2C5-418F-A888-C5188DFA18B5}" presName="node" presStyleLbl="node1" presStyleIdx="2" presStyleCnt="3">
@@ -2749,7 +2791,7 @@
           <a:p>
             <a:fld id="{781EED0E-C3A3-6547-84B5-5C874A80461E}" type="datetimeFigureOut">
               <a:rPr lang="en-US" smtClean="0"/>
-              <a:t>2/23/2016</a:t>
+              <a:t>2/24/16</a:t>
             </a:fld>
             <a:endParaRPr lang="en-US"/>
           </a:p>
@@ -3599,7 +3641,7 @@
           <a:p>
             <a:fld id="{13D90BEE-441C-BD4C-99D6-7F1A5394320C}" type="datetimeFigureOut">
               <a:rPr lang="en-US" smtClean="0"/>
-              <a:t>2/23/2016</a:t>
+              <a:t>2/24/16</a:t>
             </a:fld>
             <a:endParaRPr lang="en-US"/>
           </a:p>
@@ -3769,7 +3811,7 @@
           <a:p>
             <a:fld id="{13D90BEE-441C-BD4C-99D6-7F1A5394320C}" type="datetimeFigureOut">
               <a:rPr lang="en-US" smtClean="0"/>
-              <a:t>2/23/2016</a:t>
+              <a:t>2/24/16</a:t>
             </a:fld>
             <a:endParaRPr lang="en-US"/>
           </a:p>
@@ -3949,7 +3991,7 @@
           <a:p>
             <a:fld id="{13D90BEE-441C-BD4C-99D6-7F1A5394320C}" type="datetimeFigureOut">
               <a:rPr lang="en-US" smtClean="0"/>
-              <a:t>2/23/2016</a:t>
+              <a:t>2/24/16</a:t>
             </a:fld>
             <a:endParaRPr lang="en-US"/>
           </a:p>
@@ -4119,7 +4161,7 @@
           <a:p>
             <a:fld id="{13D90BEE-441C-BD4C-99D6-7F1A5394320C}" type="datetimeFigureOut">
               <a:rPr lang="en-US" smtClean="0"/>
-              <a:t>2/23/2016</a:t>
+              <a:t>2/24/16</a:t>
             </a:fld>
             <a:endParaRPr lang="en-US"/>
           </a:p>
@@ -4365,7 +4407,7 @@
           <a:p>
             <a:fld id="{13D90BEE-441C-BD4C-99D6-7F1A5394320C}" type="datetimeFigureOut">
               <a:rPr lang="en-US" smtClean="0"/>
-              <a:t>2/23/2016</a:t>
+              <a:t>2/24/16</a:t>
             </a:fld>
             <a:endParaRPr lang="en-US"/>
           </a:p>
@@ -4653,7 +4695,7 @@
           <a:p>
             <a:fld id="{13D90BEE-441C-BD4C-99D6-7F1A5394320C}" type="datetimeFigureOut">
               <a:rPr lang="en-US" smtClean="0"/>
-              <a:t>2/23/2016</a:t>
+              <a:t>2/24/16</a:t>
             </a:fld>
             <a:endParaRPr lang="en-US"/>
           </a:p>
@@ -5075,7 +5117,7 @@
           <a:p>
             <a:fld id="{13D90BEE-441C-BD4C-99D6-7F1A5394320C}" type="datetimeFigureOut">
               <a:rPr lang="en-US" smtClean="0"/>
-              <a:t>2/23/2016</a:t>
+              <a:t>2/24/16</a:t>
             </a:fld>
             <a:endParaRPr lang="en-US"/>
           </a:p>
@@ -5193,7 +5235,7 @@
           <a:p>
             <a:fld id="{13D90BEE-441C-BD4C-99D6-7F1A5394320C}" type="datetimeFigureOut">
               <a:rPr lang="en-US" smtClean="0"/>
-              <a:t>2/23/2016</a:t>
+              <a:t>2/24/16</a:t>
             </a:fld>
             <a:endParaRPr lang="en-US"/>
           </a:p>
@@ -5288,7 +5330,7 @@
           <a:p>
             <a:fld id="{13D90BEE-441C-BD4C-99D6-7F1A5394320C}" type="datetimeFigureOut">
               <a:rPr lang="en-US" smtClean="0"/>
-              <a:t>2/23/2016</a:t>
+              <a:t>2/24/16</a:t>
             </a:fld>
             <a:endParaRPr lang="en-US"/>
           </a:p>
@@ -5565,7 +5607,7 @@
           <a:p>
             <a:fld id="{13D90BEE-441C-BD4C-99D6-7F1A5394320C}" type="datetimeFigureOut">
               <a:rPr lang="en-US" smtClean="0"/>
-              <a:t>2/23/2016</a:t>
+              <a:t>2/24/16</a:t>
             </a:fld>
             <a:endParaRPr lang="en-US"/>
           </a:p>
@@ -5822,7 +5864,7 @@
           <a:p>
             <a:fld id="{13D90BEE-441C-BD4C-99D6-7F1A5394320C}" type="datetimeFigureOut">
               <a:rPr lang="en-US" smtClean="0"/>
-              <a:t>2/23/2016</a:t>
+              <a:t>2/24/16</a:t>
             </a:fld>
             <a:endParaRPr lang="en-US"/>
           </a:p>
@@ -6035,7 +6077,7 @@
           <a:p>
             <a:fld id="{13D90BEE-441C-BD4C-99D6-7F1A5394320C}" type="datetimeFigureOut">
               <a:rPr lang="en-US" smtClean="0"/>
-              <a:t>2/23/2016</a:t>
+              <a:t>2/24/16</a:t>
             </a:fld>
             <a:endParaRPr lang="en-US"/>
           </a:p>
@@ -6528,7 +6570,7 @@
   <p:timing>
     <p:tnLst>
       <p:par>
-        <p:cTn id="1" dur="indefinite" restart="never" nodeType="tmRoot">
+        <p:cTn xmlns:p14="http://schemas.microsoft.com/office/powerpoint/2010/main" id="1" dur="indefinite" restart="never" nodeType="tmRoot">
           <p:childTnLst>
             <p:seq concurrent="1" nextAc="seek">
               <p:cTn id="2" dur="indefinite" nodeType="mainSeq">
@@ -6666,6 +6708,923 @@
 </p:sld>
 </file>
 
+<file path=ppt/slides/slide10.xml><?xml version="1.0" encoding="utf-8"?>
+<p:sld xmlns:a="http://schemas.openxmlformats.org/drawingml/2006/main" xmlns:r="http://schemas.openxmlformats.org/officeDocument/2006/relationships" xmlns:p="http://schemas.openxmlformats.org/presentationml/2006/main">
+  <p:cSld>
+    <p:spTree>
+      <p:nvGrpSpPr>
+        <p:cNvPr id="1" name=""/>
+        <p:cNvGrpSpPr/>
+        <p:nvPr/>
+      </p:nvGrpSpPr>
+      <p:grpSpPr>
+        <a:xfrm>
+          <a:off x="0" y="0"/>
+          <a:ext cx="0" cy="0"/>
+          <a:chOff x="0" y="0"/>
+          <a:chExt cx="0" cy="0"/>
+        </a:xfrm>
+      </p:grpSpPr>
+      <p:sp>
+        <p:nvSpPr>
+          <p:cNvPr id="2" name="Title 1"/>
+          <p:cNvSpPr>
+            <a:spLocks noGrp="1"/>
+          </p:cNvSpPr>
+          <p:nvPr>
+            <p:ph type="title"/>
+          </p:nvPr>
+        </p:nvSpPr>
+        <p:spPr/>
+        <p:txBody>
+          <a:bodyPr>
+            <a:normAutofit fontScale="90000"/>
+          </a:bodyPr>
+          <a:lstStyle/>
+          <a:p>
+            <a:r>
+              <a:rPr lang="en-US" dirty="0" err="1" smtClean="0"/>
+              <a:t>Bokeh</a:t>
+            </a:r>
+            <a:r>
+              <a:rPr lang="en-US" dirty="0" smtClean="0"/>
+              <a:t> – language based visualization system (instead of GUI)</a:t>
+            </a:r>
+            <a:endParaRPr lang="en-US" dirty="0"/>
+          </a:p>
+        </p:txBody>
+      </p:sp>
+      <p:sp>
+        <p:nvSpPr>
+          <p:cNvPr id="3" name="Content Placeholder 2"/>
+          <p:cNvSpPr>
+            <a:spLocks noGrp="1"/>
+          </p:cNvSpPr>
+          <p:nvPr>
+            <p:ph idx="1"/>
+          </p:nvPr>
+        </p:nvSpPr>
+        <p:spPr>
+          <a:xfrm>
+            <a:off x="457200" y="1784027"/>
+            <a:ext cx="8229600" cy="4525963"/>
+          </a:xfrm>
+        </p:spPr>
+        <p:txBody>
+          <a:bodyPr>
+            <a:normAutofit fontScale="92500"/>
+          </a:bodyPr>
+          <a:lstStyle/>
+          <a:p>
+            <a:r>
+              <a:rPr lang="en-US" dirty="0" smtClean="0"/>
+              <a:t>Interactive visualization (panning and zooming)</a:t>
+            </a:r>
+          </a:p>
+          <a:p>
+            <a:r>
+              <a:rPr lang="en-US" dirty="0" smtClean="0"/>
+              <a:t>Browser-based </a:t>
+            </a:r>
+          </a:p>
+          <a:p>
+            <a:r>
+              <a:rPr lang="en-US" dirty="0"/>
+              <a:t>V</a:t>
+            </a:r>
+            <a:r>
+              <a:rPr lang="en-US" dirty="0" smtClean="0"/>
+              <a:t>isualization for big-data</a:t>
+            </a:r>
+          </a:p>
+          <a:p>
+            <a:r>
+              <a:rPr lang="en-US" dirty="0" smtClean="0"/>
+              <a:t>Driven by python </a:t>
+            </a:r>
+          </a:p>
+          <a:p>
+            <a:r>
+              <a:rPr lang="en-US" dirty="0" smtClean="0"/>
+              <a:t>Plot “react” to live data source </a:t>
+            </a:r>
+          </a:p>
+          <a:p>
+            <a:r>
+              <a:rPr lang="en-US" dirty="0" smtClean="0"/>
+              <a:t>“Easy” to learn but enough depth for pro-users </a:t>
+            </a:r>
+          </a:p>
+          <a:p>
+            <a:r>
+              <a:rPr lang="en-US" dirty="0" err="1" smtClean="0"/>
+              <a:t>Hella</a:t>
+            </a:r>
+            <a:r>
+              <a:rPr lang="en-US" dirty="0" smtClean="0"/>
+              <a:t> good documentation and examples </a:t>
+            </a:r>
+          </a:p>
+          <a:p>
+            <a:endParaRPr lang="en-US" dirty="0"/>
+          </a:p>
+        </p:txBody>
+      </p:sp>
+    </p:spTree>
+    <p:extLst>
+      <p:ext uri="{BB962C8B-B14F-4D97-AF65-F5344CB8AC3E}">
+        <p14:creationId xmlns:p14="http://schemas.microsoft.com/office/powerpoint/2010/main" val="2927920398"/>
+      </p:ext>
+    </p:extLst>
+  </p:cSld>
+  <p:clrMapOvr>
+    <a:masterClrMapping/>
+  </p:clrMapOvr>
+  <p:timing>
+    <p:tnLst>
+      <p:par>
+        <p:cTn xmlns:p14="http://schemas.microsoft.com/office/powerpoint/2010/main" id="1" dur="indefinite" restart="never" nodeType="tmRoot"/>
+      </p:par>
+    </p:tnLst>
+  </p:timing>
+</p:sld>
+</file>
+
+<file path=ppt/slides/slide11.xml><?xml version="1.0" encoding="utf-8"?>
+<p:sld xmlns:a="http://schemas.openxmlformats.org/drawingml/2006/main" xmlns:r="http://schemas.openxmlformats.org/officeDocument/2006/relationships" xmlns:p="http://schemas.openxmlformats.org/presentationml/2006/main">
+  <p:cSld>
+    <p:spTree>
+      <p:nvGrpSpPr>
+        <p:cNvPr id="1" name=""/>
+        <p:cNvGrpSpPr/>
+        <p:nvPr/>
+      </p:nvGrpSpPr>
+      <p:grpSpPr>
+        <a:xfrm>
+          <a:off x="0" y="0"/>
+          <a:ext cx="0" cy="0"/>
+          <a:chOff x="0" y="0"/>
+          <a:chExt cx="0" cy="0"/>
+        </a:xfrm>
+      </p:grpSpPr>
+      <p:sp>
+        <p:nvSpPr>
+          <p:cNvPr id="2" name="Title 1"/>
+          <p:cNvSpPr>
+            <a:spLocks noGrp="1"/>
+          </p:cNvSpPr>
+          <p:nvPr>
+            <p:ph type="title"/>
+          </p:nvPr>
+        </p:nvSpPr>
+        <p:spPr/>
+        <p:txBody>
+          <a:bodyPr>
+            <a:normAutofit/>
+          </a:bodyPr>
+          <a:lstStyle/>
+          <a:p>
+            <a:r>
+              <a:rPr lang="en-US" dirty="0" smtClean="0"/>
+              <a:t>Interactive visualization</a:t>
+            </a:r>
+            <a:endParaRPr lang="en-US" dirty="0"/>
+          </a:p>
+        </p:txBody>
+      </p:sp>
+      <p:pic>
+        <p:nvPicPr>
+          <p:cNvPr id="6" name="Picture 5" descr="Screenshot 2016-02-23 16.17.23.png"/>
+          <p:cNvPicPr>
+            <a:picLocks noChangeAspect="1"/>
+          </p:cNvPicPr>
+          <p:nvPr/>
+        </p:nvPicPr>
+        <p:blipFill>
+          <a:blip r:embed="rId2">
+            <a:extLst>
+              <a:ext uri="{28A0092B-C50C-407E-A947-70E740481C1C}">
+                <a14:useLocalDpi xmlns:a14="http://schemas.microsoft.com/office/drawing/2010/main" val="0"/>
+              </a:ext>
+            </a:extLst>
+          </a:blip>
+          <a:stretch>
+            <a:fillRect/>
+          </a:stretch>
+        </p:blipFill>
+        <p:spPr>
+          <a:xfrm>
+            <a:off x="153949" y="1302188"/>
+            <a:ext cx="5138967" cy="4771898"/>
+          </a:xfrm>
+          <a:prstGeom prst="rect">
+            <a:avLst/>
+          </a:prstGeom>
+        </p:spPr>
+      </p:pic>
+      <p:pic>
+        <p:nvPicPr>
+          <p:cNvPr id="5" name="Picture 4" descr="Screenshot 2016-02-23 16.17.34.png"/>
+          <p:cNvPicPr>
+            <a:picLocks noChangeAspect="1"/>
+          </p:cNvPicPr>
+          <p:nvPr/>
+        </p:nvPicPr>
+        <p:blipFill>
+          <a:blip r:embed="rId3">
+            <a:extLst>
+              <a:ext uri="{28A0092B-C50C-407E-A947-70E740481C1C}">
+                <a14:useLocalDpi xmlns:a14="http://schemas.microsoft.com/office/drawing/2010/main" val="0"/>
+              </a:ext>
+            </a:extLst>
+          </a:blip>
+          <a:stretch>
+            <a:fillRect/>
+          </a:stretch>
+        </p:blipFill>
+        <p:spPr>
+          <a:xfrm>
+            <a:off x="4199722" y="2078531"/>
+            <a:ext cx="4944278" cy="4779469"/>
+          </a:xfrm>
+          <a:prstGeom prst="rect">
+            <a:avLst/>
+          </a:prstGeom>
+        </p:spPr>
+      </p:pic>
+      <p:cxnSp>
+        <p:nvCxnSpPr>
+          <p:cNvPr id="8" name="Straight Arrow Connector 7"/>
+          <p:cNvCxnSpPr/>
+          <p:nvPr/>
+        </p:nvCxnSpPr>
+        <p:spPr>
+          <a:xfrm>
+            <a:off x="4002705" y="2629675"/>
+            <a:ext cx="2103986" cy="679867"/>
+          </a:xfrm>
+          <a:prstGeom prst="straightConnector1">
+            <a:avLst/>
+          </a:prstGeom>
+          <a:ln>
+            <a:solidFill>
+              <a:schemeClr val="tx1"/>
+            </a:solidFill>
+            <a:tailEnd type="arrow"/>
+          </a:ln>
+        </p:spPr>
+        <p:style>
+          <a:lnRef idx="2">
+            <a:schemeClr val="accent1"/>
+          </a:lnRef>
+          <a:fillRef idx="0">
+            <a:schemeClr val="accent1"/>
+          </a:fillRef>
+          <a:effectRef idx="1">
+            <a:schemeClr val="accent1"/>
+          </a:effectRef>
+          <a:fontRef idx="minor">
+            <a:schemeClr val="tx1"/>
+          </a:fontRef>
+        </p:style>
+      </p:cxnSp>
+      <p:pic>
+        <p:nvPicPr>
+          <p:cNvPr id="10" name="Picture 9" descr="Screenshot 2016-02-23 16.28.35.png"/>
+          <p:cNvPicPr>
+            <a:picLocks noChangeAspect="1"/>
+          </p:cNvPicPr>
+          <p:nvPr/>
+        </p:nvPicPr>
+        <p:blipFill>
+          <a:blip r:embed="rId4">
+            <a:extLst>
+              <a:ext uri="{28A0092B-C50C-407E-A947-70E740481C1C}">
+                <a14:useLocalDpi xmlns:a14="http://schemas.microsoft.com/office/drawing/2010/main" val="0"/>
+              </a:ext>
+            </a:extLst>
+          </a:blip>
+          <a:stretch>
+            <a:fillRect/>
+          </a:stretch>
+        </p:blipFill>
+        <p:spPr>
+          <a:xfrm>
+            <a:off x="118819" y="1302188"/>
+            <a:ext cx="8161805" cy="3520778"/>
+          </a:xfrm>
+          <a:prstGeom prst="rect">
+            <a:avLst/>
+          </a:prstGeom>
+        </p:spPr>
+      </p:pic>
+    </p:spTree>
+    <p:extLst>
+      <p:ext uri="{BB962C8B-B14F-4D97-AF65-F5344CB8AC3E}">
+        <p14:creationId xmlns:p14="http://schemas.microsoft.com/office/powerpoint/2010/main" val="2019290259"/>
+      </p:ext>
+    </p:extLst>
+  </p:cSld>
+  <p:clrMapOvr>
+    <a:masterClrMapping/>
+  </p:clrMapOvr>
+  <p:timing>
+    <p:tnLst>
+      <p:par>
+        <p:cTn xmlns:p14="http://schemas.microsoft.com/office/powerpoint/2010/main" id="1" dur="indefinite" restart="never" nodeType="tmRoot">
+          <p:childTnLst>
+            <p:seq concurrent="1" nextAc="seek">
+              <p:cTn id="2" dur="indefinite" nodeType="mainSeq">
+                <p:childTnLst>
+                  <p:par>
+                    <p:cTn id="3" fill="hold">
+                      <p:stCondLst>
+                        <p:cond delay="indefinite"/>
+                      </p:stCondLst>
+                      <p:childTnLst>
+                        <p:par>
+                          <p:cTn id="4" fill="hold">
+                            <p:stCondLst>
+                              <p:cond delay="0"/>
+                            </p:stCondLst>
+                            <p:childTnLst>
+                              <p:par>
+                                <p:cTn id="5" presetID="1" presetClass="entr" presetSubtype="0" fill="hold" nodeType="clickEffect">
+                                  <p:stCondLst>
+                                    <p:cond delay="0"/>
+                                  </p:stCondLst>
+                                  <p:childTnLst>
+                                    <p:set>
+                                      <p:cBhvr>
+                                        <p:cTn id="6" dur="1" fill="hold">
+                                          <p:stCondLst>
+                                            <p:cond delay="0"/>
+                                          </p:stCondLst>
+                                        </p:cTn>
+                                        <p:tgtEl>
+                                          <p:spTgt spid="10"/>
+                                        </p:tgtEl>
+                                        <p:attrNameLst>
+                                          <p:attrName>style.visibility</p:attrName>
+                                        </p:attrNameLst>
+                                      </p:cBhvr>
+                                      <p:to>
+                                        <p:strVal val="visible"/>
+                                      </p:to>
+                                    </p:set>
+                                  </p:childTnLst>
+                                </p:cTn>
+                              </p:par>
+                            </p:childTnLst>
+                          </p:cTn>
+                        </p:par>
+                      </p:childTnLst>
+                    </p:cTn>
+                  </p:par>
+                </p:childTnLst>
+              </p:cTn>
+              <p:prevCondLst>
+                <p:cond evt="onPrev" delay="0">
+                  <p:tgtEl>
+                    <p:sldTgt/>
+                  </p:tgtEl>
+                </p:cond>
+              </p:prevCondLst>
+              <p:nextCondLst>
+                <p:cond evt="onNext" delay="0">
+                  <p:tgtEl>
+                    <p:sldTgt/>
+                  </p:tgtEl>
+                </p:cond>
+              </p:nextCondLst>
+            </p:seq>
+          </p:childTnLst>
+        </p:cTn>
+      </p:par>
+    </p:tnLst>
+  </p:timing>
+</p:sld>
+</file>
+
+<file path=ppt/slides/slide12.xml><?xml version="1.0" encoding="utf-8"?>
+<p:sld xmlns:a="http://schemas.openxmlformats.org/drawingml/2006/main" xmlns:r="http://schemas.openxmlformats.org/officeDocument/2006/relationships" xmlns:p="http://schemas.openxmlformats.org/presentationml/2006/main">
+  <p:cSld>
+    <p:spTree>
+      <p:nvGrpSpPr>
+        <p:cNvPr id="1" name=""/>
+        <p:cNvGrpSpPr/>
+        <p:nvPr/>
+      </p:nvGrpSpPr>
+      <p:grpSpPr>
+        <a:xfrm>
+          <a:off x="0" y="0"/>
+          <a:ext cx="0" cy="0"/>
+          <a:chOff x="0" y="0"/>
+          <a:chExt cx="0" cy="0"/>
+        </a:xfrm>
+      </p:grpSpPr>
+      <p:sp>
+        <p:nvSpPr>
+          <p:cNvPr id="2" name="Title 1"/>
+          <p:cNvSpPr>
+            <a:spLocks noGrp="1"/>
+          </p:cNvSpPr>
+          <p:nvPr>
+            <p:ph type="title"/>
+          </p:nvPr>
+        </p:nvSpPr>
+        <p:spPr/>
+        <p:txBody>
+          <a:bodyPr>
+            <a:normAutofit fontScale="90000"/>
+          </a:bodyPr>
+          <a:lstStyle/>
+          <a:p>
+            <a:r>
+              <a:rPr lang="en-US" dirty="0" smtClean="0"/>
+              <a:t>Browser-Based </a:t>
+            </a:r>
+            <a:br>
+              <a:rPr lang="en-US" dirty="0" smtClean="0"/>
+            </a:br>
+            <a:endParaRPr lang="en-US" dirty="0"/>
+          </a:p>
+        </p:txBody>
+      </p:sp>
+      <p:sp>
+        <p:nvSpPr>
+          <p:cNvPr id="3" name="Content Placeholder 2"/>
+          <p:cNvSpPr>
+            <a:spLocks noGrp="1"/>
+          </p:cNvSpPr>
+          <p:nvPr>
+            <p:ph idx="1"/>
+          </p:nvPr>
+        </p:nvSpPr>
+        <p:spPr>
+          <a:xfrm>
+            <a:off x="328908" y="1099920"/>
+            <a:ext cx="8229600" cy="4525963"/>
+          </a:xfrm>
+        </p:spPr>
+        <p:txBody>
+          <a:bodyPr/>
+          <a:lstStyle/>
+          <a:p>
+            <a:r>
+              <a:rPr lang="en-US" dirty="0" smtClean="0"/>
+              <a:t>Default output .html file -&gt; new tab in browser</a:t>
+            </a:r>
+            <a:endParaRPr lang="en-US" dirty="0"/>
+          </a:p>
+        </p:txBody>
+      </p:sp>
+      <p:pic>
+        <p:nvPicPr>
+          <p:cNvPr id="4" name="Picture 3" descr="Screenshot 2016-02-23 16.38.51.png"/>
+          <p:cNvPicPr>
+            <a:picLocks noChangeAspect="1"/>
+          </p:cNvPicPr>
+          <p:nvPr/>
+        </p:nvPicPr>
+        <p:blipFill>
+          <a:blip r:embed="rId2">
+            <a:extLst>
+              <a:ext uri="{28A0092B-C50C-407E-A947-70E740481C1C}">
+                <a14:useLocalDpi xmlns:a14="http://schemas.microsoft.com/office/drawing/2010/main" val="0"/>
+              </a:ext>
+            </a:extLst>
+          </a:blip>
+          <a:stretch>
+            <a:fillRect/>
+          </a:stretch>
+        </p:blipFill>
+        <p:spPr>
+          <a:xfrm>
+            <a:off x="602972" y="1706287"/>
+            <a:ext cx="5904959" cy="5421093"/>
+          </a:xfrm>
+          <a:prstGeom prst="rect">
+            <a:avLst/>
+          </a:prstGeom>
+        </p:spPr>
+      </p:pic>
+    </p:spTree>
+    <p:extLst>
+      <p:ext uri="{BB962C8B-B14F-4D97-AF65-F5344CB8AC3E}">
+        <p14:creationId xmlns:p14="http://schemas.microsoft.com/office/powerpoint/2010/main" val="1969240029"/>
+      </p:ext>
+    </p:extLst>
+  </p:cSld>
+  <p:clrMapOvr>
+    <a:masterClrMapping/>
+  </p:clrMapOvr>
+  <p:timing>
+    <p:tnLst>
+      <p:par>
+        <p:cTn xmlns:p14="http://schemas.microsoft.com/office/powerpoint/2010/main" id="1" dur="indefinite" restart="never" nodeType="tmRoot"/>
+      </p:par>
+    </p:tnLst>
+  </p:timing>
+</p:sld>
+</file>
+
+<file path=ppt/slides/slide13.xml><?xml version="1.0" encoding="utf-8"?>
+<p:sld xmlns:a="http://schemas.openxmlformats.org/drawingml/2006/main" xmlns:r="http://schemas.openxmlformats.org/officeDocument/2006/relationships" xmlns:p="http://schemas.openxmlformats.org/presentationml/2006/main">
+  <p:cSld>
+    <p:spTree>
+      <p:nvGrpSpPr>
+        <p:cNvPr id="1" name=""/>
+        <p:cNvGrpSpPr/>
+        <p:nvPr/>
+      </p:nvGrpSpPr>
+      <p:grpSpPr>
+        <a:xfrm>
+          <a:off x="0" y="0"/>
+          <a:ext cx="0" cy="0"/>
+          <a:chOff x="0" y="0"/>
+          <a:chExt cx="0" cy="0"/>
+        </a:xfrm>
+      </p:grpSpPr>
+      <p:sp>
+        <p:nvSpPr>
+          <p:cNvPr id="2" name="Title 1"/>
+          <p:cNvSpPr>
+            <a:spLocks noGrp="1"/>
+          </p:cNvSpPr>
+          <p:nvPr>
+            <p:ph type="title"/>
+          </p:nvPr>
+        </p:nvSpPr>
+        <p:spPr/>
+        <p:txBody>
+          <a:bodyPr/>
+          <a:lstStyle/>
+          <a:p>
+            <a:r>
+              <a:rPr lang="en-US" dirty="0" err="1" smtClean="0"/>
+              <a:t>Bokeh</a:t>
+            </a:r>
+            <a:r>
+              <a:rPr lang="en-US" dirty="0" smtClean="0"/>
+              <a:t> Server</a:t>
+            </a:r>
+            <a:endParaRPr lang="en-US" dirty="0"/>
+          </a:p>
+        </p:txBody>
+      </p:sp>
+      <p:pic>
+        <p:nvPicPr>
+          <p:cNvPr id="4" name="Picture 3" descr="Screenshot 2016-02-23 16.47.38.png"/>
+          <p:cNvPicPr>
+            <a:picLocks noChangeAspect="1"/>
+          </p:cNvPicPr>
+          <p:nvPr/>
+        </p:nvPicPr>
+        <p:blipFill>
+          <a:blip r:embed="rId2">
+            <a:extLst>
+              <a:ext uri="{28A0092B-C50C-407E-A947-70E740481C1C}">
+                <a14:useLocalDpi xmlns:a14="http://schemas.microsoft.com/office/drawing/2010/main" val="0"/>
+              </a:ext>
+            </a:extLst>
+          </a:blip>
+          <a:stretch>
+            <a:fillRect/>
+          </a:stretch>
+        </p:blipFill>
+        <p:spPr>
+          <a:xfrm>
+            <a:off x="307900" y="1417638"/>
+            <a:ext cx="8261994" cy="4325312"/>
+          </a:xfrm>
+          <a:prstGeom prst="rect">
+            <a:avLst/>
+          </a:prstGeom>
+        </p:spPr>
+      </p:pic>
+    </p:spTree>
+    <p:extLst>
+      <p:ext uri="{BB962C8B-B14F-4D97-AF65-F5344CB8AC3E}">
+        <p14:creationId xmlns:p14="http://schemas.microsoft.com/office/powerpoint/2010/main" val="3637488447"/>
+      </p:ext>
+    </p:extLst>
+  </p:cSld>
+  <p:clrMapOvr>
+    <a:masterClrMapping/>
+  </p:clrMapOvr>
+  <p:timing>
+    <p:tnLst>
+      <p:par>
+        <p:cTn xmlns:p14="http://schemas.microsoft.com/office/powerpoint/2010/main" id="1" dur="indefinite" restart="never" nodeType="tmRoot"/>
+      </p:par>
+    </p:tnLst>
+  </p:timing>
+</p:sld>
+</file>
+
+<file path=ppt/slides/slide14.xml><?xml version="1.0" encoding="utf-8"?>
+<p:sld xmlns:a="http://schemas.openxmlformats.org/drawingml/2006/main" xmlns:r="http://schemas.openxmlformats.org/officeDocument/2006/relationships" xmlns:p="http://schemas.openxmlformats.org/presentationml/2006/main">
+  <p:cSld>
+    <p:spTree>
+      <p:nvGrpSpPr>
+        <p:cNvPr id="1" name=""/>
+        <p:cNvGrpSpPr/>
+        <p:nvPr/>
+      </p:nvGrpSpPr>
+      <p:grpSpPr>
+        <a:xfrm>
+          <a:off x="0" y="0"/>
+          <a:ext cx="0" cy="0"/>
+          <a:chOff x="0" y="0"/>
+          <a:chExt cx="0" cy="0"/>
+        </a:xfrm>
+      </p:grpSpPr>
+      <p:pic>
+        <p:nvPicPr>
+          <p:cNvPr id="4" name="Picture 3" descr="Screenshot 2016-02-24 09.53.05.png"/>
+          <p:cNvPicPr>
+            <a:picLocks noChangeAspect="1"/>
+          </p:cNvPicPr>
+          <p:nvPr/>
+        </p:nvPicPr>
+        <p:blipFill>
+          <a:blip r:embed="rId2">
+            <a:extLst>
+              <a:ext uri="{28A0092B-C50C-407E-A947-70E740481C1C}">
+                <a14:useLocalDpi xmlns:a14="http://schemas.microsoft.com/office/drawing/2010/main" val="0"/>
+              </a:ext>
+            </a:extLst>
+          </a:blip>
+          <a:stretch>
+            <a:fillRect/>
+          </a:stretch>
+        </p:blipFill>
+        <p:spPr>
+          <a:xfrm>
+            <a:off x="0" y="0"/>
+            <a:ext cx="9144000" cy="4545959"/>
+          </a:xfrm>
+          <a:prstGeom prst="rect">
+            <a:avLst/>
+          </a:prstGeom>
+        </p:spPr>
+      </p:pic>
+      <p:grpSp>
+        <p:nvGrpSpPr>
+          <p:cNvPr id="5" name="Group 4"/>
+          <p:cNvGrpSpPr/>
+          <p:nvPr/>
+        </p:nvGrpSpPr>
+        <p:grpSpPr>
+          <a:xfrm>
+            <a:off x="226584" y="767833"/>
+            <a:ext cx="8213743" cy="6381958"/>
+            <a:chOff x="436192" y="476042"/>
+            <a:chExt cx="8213743" cy="6381958"/>
+          </a:xfrm>
+        </p:grpSpPr>
+        <p:pic>
+          <p:nvPicPr>
+            <p:cNvPr id="6" name="Picture 5" descr="Screenshot 2016-02-23 15.21.57.png"/>
+            <p:cNvPicPr>
+              <a:picLocks noChangeAspect="1"/>
+            </p:cNvPicPr>
+            <p:nvPr/>
+          </p:nvPicPr>
+          <p:blipFill>
+            <a:blip r:embed="rId3">
+              <a:extLst>
+                <a:ext uri="{28A0092B-C50C-407E-A947-70E740481C1C}">
+                  <a14:useLocalDpi xmlns:a14="http://schemas.microsoft.com/office/drawing/2010/main" val="0"/>
+                </a:ext>
+              </a:extLst>
+            </a:blip>
+            <a:stretch>
+              <a:fillRect/>
+            </a:stretch>
+          </p:blipFill>
+          <p:spPr>
+            <a:xfrm>
+              <a:off x="436192" y="476042"/>
+              <a:ext cx="4128190" cy="6381958"/>
+            </a:xfrm>
+            <a:prstGeom prst="rect">
+              <a:avLst/>
+            </a:prstGeom>
+          </p:spPr>
+        </p:pic>
+        <p:sp>
+          <p:nvSpPr>
+            <p:cNvPr id="7" name="TextBox 6"/>
+            <p:cNvSpPr txBox="1"/>
+            <p:nvPr/>
+          </p:nvSpPr>
+          <p:spPr>
+            <a:xfrm>
+              <a:off x="4873701" y="2987996"/>
+              <a:ext cx="3776234" cy="369332"/>
+            </a:xfrm>
+            <a:prstGeom prst="rect">
+              <a:avLst/>
+            </a:prstGeom>
+            <a:noFill/>
+          </p:spPr>
+          <p:txBody>
+            <a:bodyPr wrap="square" rtlCol="0">
+              <a:spAutoFit/>
+            </a:bodyPr>
+            <a:lstStyle/>
+            <a:p>
+              <a:r>
+                <a:rPr lang="en-US" dirty="0" err="1" smtClean="0"/>
+                <a:t>Howto</a:t>
+              </a:r>
+              <a:r>
+                <a:rPr lang="en-US" dirty="0" smtClean="0"/>
+                <a:t> directory in </a:t>
+              </a:r>
+              <a:r>
+                <a:rPr lang="en-US" dirty="0" err="1" smtClean="0"/>
+                <a:t>Bokeh</a:t>
+              </a:r>
+              <a:r>
+                <a:rPr lang="en-US" dirty="0" smtClean="0"/>
+                <a:t> repo!</a:t>
+              </a:r>
+              <a:endParaRPr lang="en-US" dirty="0"/>
+            </a:p>
+          </p:txBody>
+        </p:sp>
+        <p:sp>
+          <p:nvSpPr>
+            <p:cNvPr id="8" name="Right Brace 7"/>
+            <p:cNvSpPr/>
+            <p:nvPr/>
+          </p:nvSpPr>
+          <p:spPr>
+            <a:xfrm>
+              <a:off x="3912901" y="1192975"/>
+              <a:ext cx="856749" cy="4015064"/>
+            </a:xfrm>
+            <a:prstGeom prst="rightBrace">
+              <a:avLst/>
+            </a:prstGeom>
+            <a:ln w="9525">
+              <a:solidFill>
+                <a:schemeClr val="tx1"/>
+              </a:solidFill>
+            </a:ln>
+          </p:spPr>
+          <p:style>
+            <a:lnRef idx="2">
+              <a:schemeClr val="accent1"/>
+            </a:lnRef>
+            <a:fillRef idx="0">
+              <a:schemeClr val="accent1"/>
+            </a:fillRef>
+            <a:effectRef idx="1">
+              <a:schemeClr val="accent1"/>
+            </a:effectRef>
+            <a:fontRef idx="minor">
+              <a:schemeClr val="tx1"/>
+            </a:fontRef>
+          </p:style>
+          <p:txBody>
+            <a:bodyPr rtlCol="0" anchor="ctr"/>
+            <a:lstStyle/>
+            <a:p>
+              <a:pPr algn="ctr"/>
+              <a:endParaRPr lang="en-US"/>
+            </a:p>
+          </p:txBody>
+        </p:sp>
+      </p:grpSp>
+    </p:spTree>
+    <p:extLst>
+      <p:ext uri="{BB962C8B-B14F-4D97-AF65-F5344CB8AC3E}">
+        <p14:creationId xmlns:p14="http://schemas.microsoft.com/office/powerpoint/2010/main" val="137922837"/>
+      </p:ext>
+    </p:extLst>
+  </p:cSld>
+  <p:clrMapOvr>
+    <a:masterClrMapping/>
+  </p:clrMapOvr>
+  <p:timing>
+    <p:tnLst>
+      <p:par>
+        <p:cTn xmlns:p14="http://schemas.microsoft.com/office/powerpoint/2010/main" id="1" dur="indefinite" restart="never" nodeType="tmRoot">
+          <p:childTnLst>
+            <p:seq concurrent="1" nextAc="seek">
+              <p:cTn id="2" dur="indefinite" nodeType="mainSeq">
+                <p:childTnLst>
+                  <p:par>
+                    <p:cTn id="3" fill="hold">
+                      <p:stCondLst>
+                        <p:cond delay="indefinite"/>
+                      </p:stCondLst>
+                      <p:childTnLst>
+                        <p:par>
+                          <p:cTn id="4" fill="hold">
+                            <p:stCondLst>
+                              <p:cond delay="0"/>
+                            </p:stCondLst>
+                            <p:childTnLst>
+                              <p:par>
+                                <p:cTn id="5" presetID="1" presetClass="entr" presetSubtype="0" fill="hold" nodeType="clickEffect">
+                                  <p:stCondLst>
+                                    <p:cond delay="0"/>
+                                  </p:stCondLst>
+                                  <p:childTnLst>
+                                    <p:set>
+                                      <p:cBhvr>
+                                        <p:cTn id="6" dur="1" fill="hold">
+                                          <p:stCondLst>
+                                            <p:cond delay="0"/>
+                                          </p:stCondLst>
+                                        </p:cTn>
+                                        <p:tgtEl>
+                                          <p:spTgt spid="5"/>
+                                        </p:tgtEl>
+                                        <p:attrNameLst>
+                                          <p:attrName>style.visibility</p:attrName>
+                                        </p:attrNameLst>
+                                      </p:cBhvr>
+                                      <p:to>
+                                        <p:strVal val="visible"/>
+                                      </p:to>
+                                    </p:set>
+                                  </p:childTnLst>
+                                </p:cTn>
+                              </p:par>
+                            </p:childTnLst>
+                          </p:cTn>
+                        </p:par>
+                      </p:childTnLst>
+                    </p:cTn>
+                  </p:par>
+                </p:childTnLst>
+              </p:cTn>
+              <p:prevCondLst>
+                <p:cond evt="onPrev" delay="0">
+                  <p:tgtEl>
+                    <p:sldTgt/>
+                  </p:tgtEl>
+                </p:cond>
+              </p:prevCondLst>
+              <p:nextCondLst>
+                <p:cond evt="onNext" delay="0">
+                  <p:tgtEl>
+                    <p:sldTgt/>
+                  </p:tgtEl>
+                </p:cond>
+              </p:nextCondLst>
+            </p:seq>
+          </p:childTnLst>
+        </p:cTn>
+      </p:par>
+    </p:tnLst>
+  </p:timing>
+</p:sld>
+</file>
+
+<file path=ppt/slides/slide15.xml><?xml version="1.0" encoding="utf-8"?>
+<p:sld xmlns:a="http://schemas.openxmlformats.org/drawingml/2006/main" xmlns:r="http://schemas.openxmlformats.org/officeDocument/2006/relationships" xmlns:p="http://schemas.openxmlformats.org/presentationml/2006/main">
+  <p:cSld>
+    <p:spTree>
+      <p:nvGrpSpPr>
+        <p:cNvPr id="1" name=""/>
+        <p:cNvGrpSpPr/>
+        <p:nvPr/>
+      </p:nvGrpSpPr>
+      <p:grpSpPr>
+        <a:xfrm>
+          <a:off x="0" y="0"/>
+          <a:ext cx="0" cy="0"/>
+          <a:chOff x="0" y="0"/>
+          <a:chExt cx="0" cy="0"/>
+        </a:xfrm>
+      </p:grpSpPr>
+    </p:spTree>
+    <p:extLst>
+      <p:ext uri="{BB962C8B-B14F-4D97-AF65-F5344CB8AC3E}">
+        <p14:creationId xmlns:p14="http://schemas.microsoft.com/office/powerpoint/2010/main" val="2793474722"/>
+      </p:ext>
+    </p:extLst>
+  </p:cSld>
+  <p:clrMapOvr>
+    <a:masterClrMapping/>
+  </p:clrMapOvr>
+  <p:timing>
+    <p:tnLst>
+      <p:par>
+        <p:cTn xmlns:p14="http://schemas.microsoft.com/office/powerpoint/2010/main" id="1" dur="indefinite" restart="never" nodeType="tmRoot"/>
+      </p:par>
+    </p:tnLst>
+  </p:timing>
+</p:sld>
+</file>
+
 <file path=ppt/slides/slide2.xml><?xml version="1.0" encoding="utf-8"?>
 <p:sld xmlns:a="http://schemas.openxmlformats.org/drawingml/2006/main" xmlns:r="http://schemas.openxmlformats.org/officeDocument/2006/relationships" xmlns:p="http://schemas.openxmlformats.org/presentationml/2006/main">
   <p:cSld>
@@ -6768,14 +7727,14 @@
           </a:ln>
           <a:extLst>
             <a:ext uri="{909E8E84-426E-40dd-AFC4-6F175D3DCCD1}">
-              <a14:hiddenFill xmlns:a14="http://schemas.microsoft.com/office/drawing/2010/main" xmlns="">
+              <a14:hiddenFill xmlns:a14="http://schemas.microsoft.com/office/drawing/2010/main">
                 <a:solidFill>
                   <a:srgbClr val="FFFFFF"/>
                 </a:solidFill>
               </a14:hiddenFill>
             </a:ext>
             <a:ext uri="{91240B29-F687-4f45-9708-019B960494DF}">
-              <a14:hiddenLine xmlns:a14="http://schemas.microsoft.com/office/drawing/2010/main" xmlns="" w="9525">
+              <a14:hiddenLine xmlns:a14="http://schemas.microsoft.com/office/drawing/2010/main" w="9525">
                 <a:solidFill>
                   <a:srgbClr val="000000"/>
                 </a:solidFill>
@@ -7137,7 +8096,7 @@
   <p:timing>
     <p:tnLst>
       <p:par>
-        <p:cTn id="1" dur="indefinite" restart="never" nodeType="tmRoot"/>
+        <p:cTn xmlns:p14="http://schemas.microsoft.com/office/powerpoint/2010/main" id="1" dur="indefinite" restart="never" nodeType="tmRoot"/>
       </p:par>
     </p:tnLst>
   </p:timing>
@@ -7345,7 +8304,7 @@
   <p:timing>
     <p:tnLst>
       <p:par>
-        <p:cTn id="1" dur="indefinite" restart="never" nodeType="tmRoot"/>
+        <p:cTn xmlns:p14="http://schemas.microsoft.com/office/powerpoint/2010/main" id="1" dur="indefinite" restart="never" nodeType="tmRoot"/>
       </p:par>
     </p:tnLst>
   </p:timing>
@@ -7433,14 +8392,14 @@
           </a:ln>
           <a:extLst>
             <a:ext uri="{909E8E84-426E-40dd-AFC4-6F175D3DCCD1}">
-              <a14:hiddenFill xmlns:a14="http://schemas.microsoft.com/office/drawing/2010/main" xmlns="">
+              <a14:hiddenFill xmlns:a14="http://schemas.microsoft.com/office/drawing/2010/main">
                 <a:solidFill>
                   <a:srgbClr val="FFFFFF"/>
                 </a:solidFill>
               </a14:hiddenFill>
             </a:ext>
             <a:ext uri="{91240B29-F687-4f45-9708-019B960494DF}">
-              <a14:hiddenLine xmlns:a14="http://schemas.microsoft.com/office/drawing/2010/main" xmlns="" w="9525">
+              <a14:hiddenLine xmlns:a14="http://schemas.microsoft.com/office/drawing/2010/main" w="9525">
                 <a:solidFill>
                   <a:srgbClr val="000000"/>
                 </a:solidFill>
@@ -8050,7 +9009,7 @@
   <p:timing>
     <p:tnLst>
       <p:par>
-        <p:cTn id="1" dur="indefinite" restart="never" nodeType="tmRoot">
+        <p:cTn xmlns:p14="http://schemas.microsoft.com/office/powerpoint/2010/main" id="1" dur="indefinite" restart="never" nodeType="tmRoot">
           <p:childTnLst>
             <p:seq concurrent="1" nextAc="seek">
               <p:cTn id="2" dur="indefinite" nodeType="mainSeq">
@@ -8612,7 +9571,7 @@
   <p:timing>
     <p:tnLst>
       <p:par>
-        <p:cTn id="1" dur="indefinite" restart="never" nodeType="tmRoot"/>
+        <p:cTn xmlns:p14="http://schemas.microsoft.com/office/powerpoint/2010/main" id="1" dur="indefinite" restart="never" nodeType="tmRoot"/>
       </p:par>
     </p:tnLst>
   </p:timing>
@@ -8714,14 +9673,14 @@
             </a:ln>
             <a:extLst>
               <a:ext uri="{909E8E84-426E-40dd-AFC4-6F175D3DCCD1}">
-                <a14:hiddenFill xmlns:a14="http://schemas.microsoft.com/office/drawing/2010/main" xmlns="">
+                <a14:hiddenFill xmlns:a14="http://schemas.microsoft.com/office/drawing/2010/main">
                   <a:solidFill>
                     <a:srgbClr val="FFFFFF"/>
                   </a:solidFill>
                 </a14:hiddenFill>
               </a:ext>
               <a:ext uri="{91240B29-F687-4f45-9708-019B960494DF}">
-                <a14:hiddenLine xmlns:a14="http://schemas.microsoft.com/office/drawing/2010/main" xmlns="" w="9525">
+                <a14:hiddenLine xmlns:a14="http://schemas.microsoft.com/office/drawing/2010/main" w="9525">
                   <a:solidFill>
                     <a:srgbClr val="000000"/>
                   </a:solidFill>
@@ -9116,7 +10075,7 @@
   <p:timing>
     <p:tnLst>
       <p:par>
-        <p:cTn id="1" dur="indefinite" restart="never" nodeType="tmRoot">
+        <p:cTn xmlns:p14="http://schemas.microsoft.com/office/powerpoint/2010/main" id="1" dur="indefinite" restart="never" nodeType="tmRoot">
           <p:childTnLst>
             <p:seq concurrent="1" nextAc="seek">
               <p:cTn id="2" dur="indefinite" nodeType="mainSeq">
@@ -9327,7 +10286,7 @@
   <p:timing>
     <p:tnLst>
       <p:par>
-        <p:cTn id="1" dur="indefinite" restart="never" nodeType="tmRoot"/>
+        <p:cTn xmlns:p14="http://schemas.microsoft.com/office/powerpoint/2010/main" id="1" dur="indefinite" restart="never" nodeType="tmRoot"/>
       </p:par>
     </p:tnLst>
   </p:timing>
@@ -9466,7 +10425,104 @@
   <p:timing>
     <p:tnLst>
       <p:par>
-        <p:cTn id="1" dur="indefinite" restart="never" nodeType="tmRoot"/>
+        <p:cTn xmlns:p14="http://schemas.microsoft.com/office/powerpoint/2010/main" id="1" dur="indefinite" restart="never" nodeType="tmRoot"/>
+      </p:par>
+    </p:tnLst>
+  </p:timing>
+</p:sld>
+</file>
+
+<file path=ppt/slides/slide9.xml><?xml version="1.0" encoding="utf-8"?>
+<p:sld xmlns:a="http://schemas.openxmlformats.org/drawingml/2006/main" xmlns:r="http://schemas.openxmlformats.org/officeDocument/2006/relationships" xmlns:p="http://schemas.openxmlformats.org/presentationml/2006/main">
+  <p:cSld>
+    <p:spTree>
+      <p:nvGrpSpPr>
+        <p:cNvPr id="1" name=""/>
+        <p:cNvGrpSpPr/>
+        <p:nvPr/>
+      </p:nvGrpSpPr>
+      <p:grpSpPr>
+        <a:xfrm>
+          <a:off x="0" y="0"/>
+          <a:ext cx="0" cy="0"/>
+          <a:chOff x="0" y="0"/>
+          <a:chExt cx="0" cy="0"/>
+        </a:xfrm>
+      </p:grpSpPr>
+      <p:pic>
+        <p:nvPicPr>
+          <p:cNvPr id="5" name="Picture 4" descr="Screenshot 2016-02-23 09.44.40.png"/>
+          <p:cNvPicPr>
+            <a:picLocks noChangeAspect="1"/>
+          </p:cNvPicPr>
+          <p:nvPr/>
+        </p:nvPicPr>
+        <p:blipFill>
+          <a:blip r:embed="rId2">
+            <a:extLst>
+              <a:ext uri="{28A0092B-C50C-407E-A947-70E740481C1C}">
+                <a14:useLocalDpi xmlns:a14="http://schemas.microsoft.com/office/drawing/2010/main" val="0"/>
+              </a:ext>
+            </a:extLst>
+          </a:blip>
+          <a:stretch>
+            <a:fillRect/>
+          </a:stretch>
+        </p:blipFill>
+        <p:spPr>
+          <a:xfrm>
+            <a:off x="718487" y="1231024"/>
+            <a:ext cx="8037029" cy="3513072"/>
+          </a:xfrm>
+          <a:prstGeom prst="rect">
+            <a:avLst/>
+          </a:prstGeom>
+        </p:spPr>
+      </p:pic>
+      <p:pic>
+        <p:nvPicPr>
+          <p:cNvPr id="6" name="Picture 5" descr="Street-View-Bokeh-Wallpaper.jpg"/>
+          <p:cNvPicPr>
+            <a:picLocks noChangeAspect="1"/>
+          </p:cNvPicPr>
+          <p:nvPr/>
+        </p:nvPicPr>
+        <p:blipFill>
+          <a:blip r:embed="rId3">
+            <a:extLst>
+              <a:ext uri="{28A0092B-C50C-407E-A947-70E740481C1C}">
+                <a14:useLocalDpi xmlns:a14="http://schemas.microsoft.com/office/drawing/2010/main" val="0"/>
+              </a:ext>
+            </a:extLst>
+          </a:blip>
+          <a:stretch>
+            <a:fillRect/>
+          </a:stretch>
+        </p:blipFill>
+        <p:spPr>
+          <a:xfrm>
+            <a:off x="3977046" y="3912516"/>
+            <a:ext cx="4487007" cy="2804379"/>
+          </a:xfrm>
+          <a:prstGeom prst="rect">
+            <a:avLst/>
+          </a:prstGeom>
+        </p:spPr>
+      </p:pic>
+    </p:spTree>
+    <p:extLst>
+      <p:ext uri="{BB962C8B-B14F-4D97-AF65-F5344CB8AC3E}">
+        <p14:creationId xmlns:p14="http://schemas.microsoft.com/office/powerpoint/2010/main" val="1165115283"/>
+      </p:ext>
+    </p:extLst>
+  </p:cSld>
+  <p:clrMapOvr>
+    <a:masterClrMapping/>
+  </p:clrMapOvr>
+  <p:timing>
+    <p:tnLst>
+      <p:par>
+        <p:cTn xmlns:p14="http://schemas.microsoft.com/office/powerpoint/2010/main" id="1" dur="indefinite" restart="never" nodeType="tmRoot"/>
       </p:par>
     </p:tnLst>
   </p:timing>

</xml_diff>